<commit_message>
add few slides about TDD
</commit_message>
<xml_diff>
--- a/TDD/slides.pptx
+++ b/TDD/slides.pptx
@@ -7,7 +7,13 @@
   <p:sldIdLst>
     <p:sldId id="256" r:id="rId2"/>
     <p:sldId id="257" r:id="rId3"/>
-    <p:sldId id="258" r:id="rId4"/>
+    <p:sldId id="259" r:id="rId4"/>
+    <p:sldId id="260" r:id="rId5"/>
+    <p:sldId id="261" r:id="rId6"/>
+    <p:sldId id="262" r:id="rId7"/>
+    <p:sldId id="264" r:id="rId8"/>
+    <p:sldId id="263" r:id="rId9"/>
+    <p:sldId id="258" r:id="rId10"/>
   </p:sldIdLst>
   <p:sldSz cx="12192000" cy="6858000"/>
   <p:notesSz cx="6858000" cy="9144000"/>
@@ -6266,6 +6272,610 @@
         </p:nvSpPr>
         <p:spPr>
           <a:xfrm>
+            <a:off x="1103312" y="429272"/>
+            <a:ext cx="9404723" cy="1400530"/>
+          </a:xfrm>
+        </p:spPr>
+        <p:txBody>
+          <a:bodyPr/>
+          <a:lstStyle/>
+          <a:p>
+            <a:r>
+              <a:rPr lang="pl-PL" dirty="0" smtClean="0"/>
+              <a:t>Unit test – test jednostkowy</a:t>
+            </a:r>
+            <a:endParaRPr lang="pl-PL" dirty="0"/>
+          </a:p>
+        </p:txBody>
+      </p:sp>
+      <p:sp>
+        <p:nvSpPr>
+          <p:cNvPr id="3" name="Symbol zastępczy zawartości 2"/>
+          <p:cNvSpPr>
+            <a:spLocks noGrp="1"/>
+          </p:cNvSpPr>
+          <p:nvPr>
+            <p:ph idx="1"/>
+          </p:nvPr>
+        </p:nvSpPr>
+        <p:spPr/>
+        <p:txBody>
+          <a:bodyPr/>
+          <a:lstStyle/>
+          <a:p>
+            <a:r>
+              <a:rPr lang="pl-PL" dirty="0" smtClean="0"/>
+              <a:t>Unit test- jest to autonomiczna metoda która testuje działanie pojedynczych jednostek, np. metod lub obiektów.</a:t>
+            </a:r>
+          </a:p>
+          <a:p>
+            <a:r>
+              <a:rPr lang="pl-PL" dirty="0" smtClean="0"/>
+              <a:t>Testy jednostkowe wykonują się asynchronicznie!</a:t>
+            </a:r>
+          </a:p>
+          <a:p>
+            <a:r>
+              <a:rPr lang="pl-PL" dirty="0" smtClean="0"/>
+              <a:t>Przy pisaniu testów jednostkowych stosuję się zasadę 3xA (</a:t>
+            </a:r>
+            <a:r>
+              <a:rPr lang="pl-PL" dirty="0" err="1" smtClean="0"/>
+              <a:t>Arrange</a:t>
+            </a:r>
+            <a:r>
+              <a:rPr lang="pl-PL" dirty="0" smtClean="0"/>
+              <a:t>, </a:t>
+            </a:r>
+            <a:r>
+              <a:rPr lang="pl-PL" dirty="0" err="1" smtClean="0"/>
+              <a:t>Act</a:t>
+            </a:r>
+            <a:r>
+              <a:rPr lang="pl-PL" dirty="0" smtClean="0"/>
+              <a:t>, </a:t>
+            </a:r>
+            <a:r>
+              <a:rPr lang="pl-PL" dirty="0" err="1" smtClean="0"/>
+              <a:t>Assert</a:t>
+            </a:r>
+            <a:r>
+              <a:rPr lang="pl-PL" dirty="0" smtClean="0"/>
+              <a:t>)</a:t>
+            </a:r>
+            <a:endParaRPr lang="pl-PL" dirty="0"/>
+          </a:p>
+        </p:txBody>
+      </p:sp>
+    </p:spTree>
+    <p:extLst>
+      <p:ext uri="{BB962C8B-B14F-4D97-AF65-F5344CB8AC3E}">
+        <p14:creationId xmlns:p14="http://schemas.microsoft.com/office/powerpoint/2010/main" val="433641529"/>
+      </p:ext>
+    </p:extLst>
+  </p:cSld>
+  <p:clrMapOvr>
+    <a:masterClrMapping/>
+  </p:clrMapOvr>
+</p:sld>
+</file>
+
+<file path=ppt/slides/slide4.xml><?xml version="1.0" encoding="utf-8"?>
+<p:sld xmlns:a="http://schemas.openxmlformats.org/drawingml/2006/main" xmlns:r="http://schemas.openxmlformats.org/officeDocument/2006/relationships" xmlns:p="http://schemas.openxmlformats.org/presentationml/2006/main">
+  <p:cSld>
+    <p:spTree>
+      <p:nvGrpSpPr>
+        <p:cNvPr id="1" name=""/>
+        <p:cNvGrpSpPr/>
+        <p:nvPr/>
+      </p:nvGrpSpPr>
+      <p:grpSpPr>
+        <a:xfrm>
+          <a:off x="0" y="0"/>
+          <a:ext cx="0" cy="0"/>
+          <a:chOff x="0" y="0"/>
+          <a:chExt cx="0" cy="0"/>
+        </a:xfrm>
+      </p:grpSpPr>
+      <p:sp>
+        <p:nvSpPr>
+          <p:cNvPr id="2" name="Tytuł 1"/>
+          <p:cNvSpPr>
+            <a:spLocks noGrp="1"/>
+          </p:cNvSpPr>
+          <p:nvPr>
+            <p:ph type="title"/>
+          </p:nvPr>
+        </p:nvSpPr>
+        <p:spPr>
+          <a:xfrm>
+            <a:off x="1103312" y="394103"/>
+            <a:ext cx="9404723" cy="1400530"/>
+          </a:xfrm>
+        </p:spPr>
+        <p:txBody>
+          <a:bodyPr/>
+          <a:lstStyle/>
+          <a:p>
+            <a:r>
+              <a:rPr lang="pl-PL" dirty="0" err="1" smtClean="0"/>
+              <a:t>Arrange</a:t>
+            </a:r>
+            <a:r>
+              <a:rPr lang="pl-PL" dirty="0" smtClean="0"/>
+              <a:t>, </a:t>
+            </a:r>
+            <a:r>
+              <a:rPr lang="pl-PL" dirty="0" err="1" smtClean="0"/>
+              <a:t>Act</a:t>
+            </a:r>
+            <a:r>
+              <a:rPr lang="pl-PL" dirty="0" smtClean="0"/>
+              <a:t>, </a:t>
+            </a:r>
+            <a:r>
+              <a:rPr lang="pl-PL" dirty="0" err="1" smtClean="0"/>
+              <a:t>Assert</a:t>
+            </a:r>
+            <a:endParaRPr lang="pl-PL" dirty="0"/>
+          </a:p>
+        </p:txBody>
+      </p:sp>
+      <p:sp>
+        <p:nvSpPr>
+          <p:cNvPr id="3" name="Symbol zastępczy zawartości 2"/>
+          <p:cNvSpPr>
+            <a:spLocks noGrp="1"/>
+          </p:cNvSpPr>
+          <p:nvPr>
+            <p:ph idx="1"/>
+          </p:nvPr>
+        </p:nvSpPr>
+        <p:spPr/>
+        <p:txBody>
+          <a:bodyPr/>
+          <a:lstStyle/>
+          <a:p>
+            <a:r>
+              <a:rPr lang="pl-PL" dirty="0" err="1" smtClean="0"/>
+              <a:t>Arrange</a:t>
+            </a:r>
+            <a:r>
+              <a:rPr lang="pl-PL" dirty="0" smtClean="0"/>
+              <a:t> (Aranżowanie) – jest to miejsce w którym przygotowujemy niezbędne komponenty, zmienne do wykonania testu.</a:t>
+            </a:r>
+          </a:p>
+          <a:p>
+            <a:r>
+              <a:rPr lang="pl-PL" dirty="0" err="1" smtClean="0"/>
+              <a:t>Act</a:t>
+            </a:r>
+            <a:r>
+              <a:rPr lang="pl-PL" dirty="0" smtClean="0"/>
+              <a:t> (Działanie) – jest to miejsce w którym rzeczywiście wykonujemy/wywołujemy akcje którą chcemy przetestować, jeżeli chcemy testować daną metodę w tym miejscu będziemy ją wykonywać.</a:t>
+            </a:r>
+          </a:p>
+          <a:p>
+            <a:r>
+              <a:rPr lang="pl-PL" dirty="0" err="1" smtClean="0"/>
+              <a:t>Assert</a:t>
+            </a:r>
+            <a:r>
+              <a:rPr lang="pl-PL" dirty="0" smtClean="0"/>
+              <a:t> (Sprawdzanie) – w tej sekcji sprawdzamy nasze rezultaty które zostały zwrócone przez testowaną metodę. Jeśli w tym miejscu coś się nie pokryje z przewidywaną wartością, test „nie przejdzie” </a:t>
+            </a:r>
+            <a:endParaRPr lang="pl-PL" dirty="0"/>
+          </a:p>
+        </p:txBody>
+      </p:sp>
+    </p:spTree>
+    <p:extLst>
+      <p:ext uri="{BB962C8B-B14F-4D97-AF65-F5344CB8AC3E}">
+        <p14:creationId xmlns:p14="http://schemas.microsoft.com/office/powerpoint/2010/main" val="1075194706"/>
+      </p:ext>
+    </p:extLst>
+  </p:cSld>
+  <p:clrMapOvr>
+    <a:masterClrMapping/>
+  </p:clrMapOvr>
+</p:sld>
+</file>
+
+<file path=ppt/slides/slide5.xml><?xml version="1.0" encoding="utf-8"?>
+<p:sld xmlns:a="http://schemas.openxmlformats.org/drawingml/2006/main" xmlns:r="http://schemas.openxmlformats.org/officeDocument/2006/relationships" xmlns:p="http://schemas.openxmlformats.org/presentationml/2006/main">
+  <p:cSld>
+    <p:spTree>
+      <p:nvGrpSpPr>
+        <p:cNvPr id="1" name=""/>
+        <p:cNvGrpSpPr/>
+        <p:nvPr/>
+      </p:nvGrpSpPr>
+      <p:grpSpPr>
+        <a:xfrm>
+          <a:off x="0" y="0"/>
+          <a:ext cx="0" cy="0"/>
+          <a:chOff x="0" y="0"/>
+          <a:chExt cx="0" cy="0"/>
+        </a:xfrm>
+      </p:grpSpPr>
+      <p:sp>
+        <p:nvSpPr>
+          <p:cNvPr id="2" name="Tytuł 1"/>
+          <p:cNvSpPr>
+            <a:spLocks noGrp="1"/>
+          </p:cNvSpPr>
+          <p:nvPr>
+            <p:ph type="title"/>
+          </p:nvPr>
+        </p:nvSpPr>
+        <p:spPr>
+          <a:xfrm>
+            <a:off x="1103312" y="464441"/>
+            <a:ext cx="9404723" cy="1400530"/>
+          </a:xfrm>
+        </p:spPr>
+        <p:txBody>
+          <a:bodyPr/>
+          <a:lstStyle/>
+          <a:p>
+            <a:r>
+              <a:rPr lang="pl-PL" dirty="0" smtClean="0"/>
+              <a:t>Test jednostkowy - Demo </a:t>
+            </a:r>
+            <a:endParaRPr lang="pl-PL" dirty="0"/>
+          </a:p>
+        </p:txBody>
+      </p:sp>
+      <p:sp>
+        <p:nvSpPr>
+          <p:cNvPr id="3" name="Symbol zastępczy zawartości 2"/>
+          <p:cNvSpPr>
+            <a:spLocks noGrp="1"/>
+          </p:cNvSpPr>
+          <p:nvPr>
+            <p:ph idx="1"/>
+          </p:nvPr>
+        </p:nvSpPr>
+        <p:spPr/>
+        <p:txBody>
+          <a:bodyPr/>
+          <a:lstStyle/>
+          <a:p>
+            <a:endParaRPr lang="pl-PL"/>
+          </a:p>
+        </p:txBody>
+      </p:sp>
+    </p:spTree>
+    <p:extLst>
+      <p:ext uri="{BB962C8B-B14F-4D97-AF65-F5344CB8AC3E}">
+        <p14:creationId xmlns:p14="http://schemas.microsoft.com/office/powerpoint/2010/main" val="85332309"/>
+      </p:ext>
+    </p:extLst>
+  </p:cSld>
+  <p:clrMapOvr>
+    <a:masterClrMapping/>
+  </p:clrMapOvr>
+</p:sld>
+</file>
+
+<file path=ppt/slides/slide6.xml><?xml version="1.0" encoding="utf-8"?>
+<p:sld xmlns:a="http://schemas.openxmlformats.org/drawingml/2006/main" xmlns:r="http://schemas.openxmlformats.org/officeDocument/2006/relationships" xmlns:p="http://schemas.openxmlformats.org/presentationml/2006/main">
+  <p:cSld>
+    <p:spTree>
+      <p:nvGrpSpPr>
+        <p:cNvPr id="1" name=""/>
+        <p:cNvGrpSpPr/>
+        <p:nvPr/>
+      </p:nvGrpSpPr>
+      <p:grpSpPr>
+        <a:xfrm>
+          <a:off x="0" y="0"/>
+          <a:ext cx="0" cy="0"/>
+          <a:chOff x="0" y="0"/>
+          <a:chExt cx="0" cy="0"/>
+        </a:xfrm>
+      </p:grpSpPr>
+      <p:sp>
+        <p:nvSpPr>
+          <p:cNvPr id="2" name="Tytuł 1"/>
+          <p:cNvSpPr>
+            <a:spLocks noGrp="1"/>
+          </p:cNvSpPr>
+          <p:nvPr>
+            <p:ph type="title"/>
+          </p:nvPr>
+        </p:nvSpPr>
+        <p:spPr>
+          <a:xfrm>
+            <a:off x="1103312" y="429272"/>
+            <a:ext cx="9404723" cy="1400530"/>
+          </a:xfrm>
+        </p:spPr>
+        <p:txBody>
+          <a:bodyPr/>
+          <a:lstStyle/>
+          <a:p>
+            <a:r>
+              <a:rPr lang="pl-PL" dirty="0" smtClean="0"/>
+              <a:t>TDD – Test-</a:t>
+            </a:r>
+            <a:r>
+              <a:rPr lang="pl-PL" dirty="0" err="1" smtClean="0"/>
+              <a:t>driven</a:t>
+            </a:r>
+            <a:r>
+              <a:rPr lang="pl-PL" dirty="0" smtClean="0"/>
+              <a:t> development</a:t>
+            </a:r>
+            <a:endParaRPr lang="pl-PL" dirty="0"/>
+          </a:p>
+        </p:txBody>
+      </p:sp>
+      <p:sp>
+        <p:nvSpPr>
+          <p:cNvPr id="3" name="Symbol zastępczy zawartości 2"/>
+          <p:cNvSpPr>
+            <a:spLocks noGrp="1"/>
+          </p:cNvSpPr>
+          <p:nvPr>
+            <p:ph idx="1"/>
+          </p:nvPr>
+        </p:nvSpPr>
+        <p:spPr/>
+        <p:txBody>
+          <a:bodyPr/>
+          <a:lstStyle/>
+          <a:p>
+            <a:r>
+              <a:rPr lang="pl-PL" dirty="0" smtClean="0"/>
+              <a:t>Pisania testów jako pierwszy krok przy pisaniu naszej aplikacji</a:t>
+            </a:r>
+          </a:p>
+          <a:p>
+            <a:r>
+              <a:rPr lang="pl-PL" dirty="0" smtClean="0"/>
+              <a:t>Podejście Red-Green-</a:t>
+            </a:r>
+            <a:r>
+              <a:rPr lang="pl-PL" dirty="0" err="1" smtClean="0"/>
+              <a:t>Refactor</a:t>
+            </a:r>
+            <a:endParaRPr lang="pl-PL" dirty="0"/>
+          </a:p>
+        </p:txBody>
+      </p:sp>
+    </p:spTree>
+    <p:extLst>
+      <p:ext uri="{BB962C8B-B14F-4D97-AF65-F5344CB8AC3E}">
+        <p14:creationId xmlns:p14="http://schemas.microsoft.com/office/powerpoint/2010/main" val="2368745736"/>
+      </p:ext>
+    </p:extLst>
+  </p:cSld>
+  <p:clrMapOvr>
+    <a:masterClrMapping/>
+  </p:clrMapOvr>
+</p:sld>
+</file>
+
+<file path=ppt/slides/slide7.xml><?xml version="1.0" encoding="utf-8"?>
+<p:sld xmlns:a="http://schemas.openxmlformats.org/drawingml/2006/main" xmlns:r="http://schemas.openxmlformats.org/officeDocument/2006/relationships" xmlns:p="http://schemas.openxmlformats.org/presentationml/2006/main">
+  <p:cSld>
+    <p:spTree>
+      <p:nvGrpSpPr>
+        <p:cNvPr id="1" name=""/>
+        <p:cNvGrpSpPr/>
+        <p:nvPr/>
+      </p:nvGrpSpPr>
+      <p:grpSpPr>
+        <a:xfrm>
+          <a:off x="0" y="0"/>
+          <a:ext cx="0" cy="0"/>
+          <a:chOff x="0" y="0"/>
+          <a:chExt cx="0" cy="0"/>
+        </a:xfrm>
+      </p:grpSpPr>
+      <p:sp>
+        <p:nvSpPr>
+          <p:cNvPr id="2" name="Tytuł 1"/>
+          <p:cNvSpPr>
+            <a:spLocks noGrp="1"/>
+          </p:cNvSpPr>
+          <p:nvPr>
+            <p:ph type="title"/>
+          </p:nvPr>
+        </p:nvSpPr>
+        <p:spPr>
+          <a:xfrm>
+            <a:off x="1103312" y="429272"/>
+            <a:ext cx="9404723" cy="1400530"/>
+          </a:xfrm>
+        </p:spPr>
+        <p:txBody>
+          <a:bodyPr/>
+          <a:lstStyle/>
+          <a:p>
+            <a:r>
+              <a:rPr lang="pl-PL" dirty="0" smtClean="0"/>
+              <a:t>Red-Green-</a:t>
+            </a:r>
+            <a:r>
+              <a:rPr lang="pl-PL" dirty="0" err="1" smtClean="0"/>
+              <a:t>Refactor</a:t>
+            </a:r>
+            <a:endParaRPr lang="pl-PL" dirty="0"/>
+          </a:p>
+        </p:txBody>
+      </p:sp>
+      <p:sp>
+        <p:nvSpPr>
+          <p:cNvPr id="3" name="Symbol zastępczy zawartości 2"/>
+          <p:cNvSpPr>
+            <a:spLocks noGrp="1"/>
+          </p:cNvSpPr>
+          <p:nvPr>
+            <p:ph idx="1"/>
+          </p:nvPr>
+        </p:nvSpPr>
+        <p:spPr/>
+        <p:txBody>
+          <a:bodyPr/>
+          <a:lstStyle/>
+          <a:p>
+            <a:r>
+              <a:rPr lang="pl-PL" dirty="0" smtClean="0"/>
+              <a:t>Red – doprowadzamy nasz test tak aby „nie przechodził”, ale miał zaimplementowane podstawowe informacje.</a:t>
+            </a:r>
+          </a:p>
+          <a:p>
+            <a:r>
+              <a:rPr lang="pl-PL" dirty="0" smtClean="0"/>
+              <a:t>Green – Doprowadzamy nasz test aby przechodził, nie liczy się w tym momencie implementacja! Na tym etapie sprawdzamy czy nasza koncepcja jest prawidłowa.</a:t>
+            </a:r>
+          </a:p>
+          <a:p>
+            <a:r>
+              <a:rPr lang="pl-PL" dirty="0" err="1" smtClean="0"/>
+              <a:t>Refactor</a:t>
+            </a:r>
+            <a:r>
+              <a:rPr lang="pl-PL" dirty="0" smtClean="0"/>
+              <a:t> – </a:t>
+            </a:r>
+            <a:r>
+              <a:rPr lang="pl-PL" dirty="0" err="1" smtClean="0"/>
+              <a:t>Refaktoryzujemy</a:t>
+            </a:r>
+            <a:r>
+              <a:rPr lang="pl-PL" dirty="0" smtClean="0"/>
+              <a:t> naszą logikę do której został </a:t>
+            </a:r>
+            <a:r>
+              <a:rPr lang="pl-PL" smtClean="0"/>
+              <a:t>napisany test. </a:t>
+            </a:r>
+            <a:endParaRPr lang="pl-PL" dirty="0"/>
+          </a:p>
+        </p:txBody>
+      </p:sp>
+    </p:spTree>
+    <p:extLst>
+      <p:ext uri="{BB962C8B-B14F-4D97-AF65-F5344CB8AC3E}">
+        <p14:creationId xmlns:p14="http://schemas.microsoft.com/office/powerpoint/2010/main" val="773946200"/>
+      </p:ext>
+    </p:extLst>
+  </p:cSld>
+  <p:clrMapOvr>
+    <a:masterClrMapping/>
+  </p:clrMapOvr>
+</p:sld>
+</file>
+
+<file path=ppt/slides/slide8.xml><?xml version="1.0" encoding="utf-8"?>
+<p:sld xmlns:a="http://schemas.openxmlformats.org/drawingml/2006/main" xmlns:r="http://schemas.openxmlformats.org/officeDocument/2006/relationships" xmlns:p="http://schemas.openxmlformats.org/presentationml/2006/main">
+  <p:cSld>
+    <p:spTree>
+      <p:nvGrpSpPr>
+        <p:cNvPr id="1" name=""/>
+        <p:cNvGrpSpPr/>
+        <p:nvPr/>
+      </p:nvGrpSpPr>
+      <p:grpSpPr>
+        <a:xfrm>
+          <a:off x="0" y="0"/>
+          <a:ext cx="0" cy="0"/>
+          <a:chOff x="0" y="0"/>
+          <a:chExt cx="0" cy="0"/>
+        </a:xfrm>
+      </p:grpSpPr>
+      <p:sp>
+        <p:nvSpPr>
+          <p:cNvPr id="2" name="Tytuł 1"/>
+          <p:cNvSpPr>
+            <a:spLocks noGrp="1"/>
+          </p:cNvSpPr>
+          <p:nvPr>
+            <p:ph type="title"/>
+          </p:nvPr>
+        </p:nvSpPr>
+        <p:spPr>
+          <a:xfrm>
+            <a:off x="1103312" y="452718"/>
+            <a:ext cx="9404723" cy="1400530"/>
+          </a:xfrm>
+        </p:spPr>
+        <p:txBody>
+          <a:bodyPr/>
+          <a:lstStyle/>
+          <a:p>
+            <a:r>
+              <a:rPr lang="pl-PL" dirty="0" smtClean="0"/>
+              <a:t>TDD - Demo</a:t>
+            </a:r>
+            <a:endParaRPr lang="pl-PL" dirty="0"/>
+          </a:p>
+        </p:txBody>
+      </p:sp>
+      <p:sp>
+        <p:nvSpPr>
+          <p:cNvPr id="3" name="Symbol zastępczy zawartości 2"/>
+          <p:cNvSpPr>
+            <a:spLocks noGrp="1"/>
+          </p:cNvSpPr>
+          <p:nvPr>
+            <p:ph idx="1"/>
+          </p:nvPr>
+        </p:nvSpPr>
+        <p:spPr/>
+        <p:txBody>
+          <a:bodyPr/>
+          <a:lstStyle/>
+          <a:p>
+            <a:endParaRPr lang="pl-PL"/>
+          </a:p>
+        </p:txBody>
+      </p:sp>
+    </p:spTree>
+    <p:extLst>
+      <p:ext uri="{BB962C8B-B14F-4D97-AF65-F5344CB8AC3E}">
+        <p14:creationId xmlns:p14="http://schemas.microsoft.com/office/powerpoint/2010/main" val="108303236"/>
+      </p:ext>
+    </p:extLst>
+  </p:cSld>
+  <p:clrMapOvr>
+    <a:masterClrMapping/>
+  </p:clrMapOvr>
+</p:sld>
+</file>
+
+<file path=ppt/slides/slide9.xml><?xml version="1.0" encoding="utf-8"?>
+<p:sld xmlns:a="http://schemas.openxmlformats.org/drawingml/2006/main" xmlns:r="http://schemas.openxmlformats.org/officeDocument/2006/relationships" xmlns:p="http://schemas.openxmlformats.org/presentationml/2006/main">
+  <p:cSld>
+    <p:spTree>
+      <p:nvGrpSpPr>
+        <p:cNvPr id="1" name=""/>
+        <p:cNvGrpSpPr/>
+        <p:nvPr/>
+      </p:nvGrpSpPr>
+      <p:grpSpPr>
+        <a:xfrm>
+          <a:off x="0" y="0"/>
+          <a:ext cx="0" cy="0"/>
+          <a:chOff x="0" y="0"/>
+          <a:chExt cx="0" cy="0"/>
+        </a:xfrm>
+      </p:grpSpPr>
+      <p:sp>
+        <p:nvSpPr>
+          <p:cNvPr id="2" name="Tytuł 1"/>
+          <p:cNvSpPr>
+            <a:spLocks noGrp="1"/>
+          </p:cNvSpPr>
+          <p:nvPr>
+            <p:ph type="title"/>
+          </p:nvPr>
+        </p:nvSpPr>
+        <p:spPr>
+          <a:xfrm>
             <a:off x="1103312" y="323764"/>
             <a:ext cx="9404723" cy="1400530"/>
           </a:xfrm>
@@ -6332,8 +6942,23 @@
           </a:p>
           <a:p>
             <a:r>
+              <a:rPr lang="pl-PL" dirty="0">
+                <a:hlinkClick r:id="rId3"/>
+              </a:rPr>
+              <a:t>http://www.mfranc.com/tdd/tdd-commit-by-commit-string-calculator-i</a:t>
+            </a:r>
+            <a:r>
+              <a:rPr lang="pl-PL" dirty="0" smtClean="0">
+                <a:hlinkClick r:id="rId3"/>
+              </a:rPr>
+              <a:t>/</a:t>
+            </a:r>
+            <a:endParaRPr lang="pl-PL" dirty="0" smtClean="0"/>
+          </a:p>
+          <a:p>
+            <a:r>
               <a:rPr lang="pl-PL" dirty="0"/>
-              <a:t>http://www.mfranc.com/tdd/tdd-commit-by-commit-string-calculator-i/</a:t>
+              <a:t>http://pl.wikipedia.org/wiki/Test_jednostkowy</a:t>
             </a:r>
             <a:endParaRPr lang="pl-PL" dirty="0" smtClean="0"/>
           </a:p>

</xml_diff>